<commit_message>
🧹 Full commit: updated pipeline services, deployment scripts, and configs in preparation for GCP account migration
</commit_message>
<xml_diff>
--- a/docs/pipeline_scematic.pptx
+++ b/docs/pipeline_scematic.pptx
@@ -119,7 +119,7 @@
 <file path=ppt/revisionInfo.xml><?xml version="1.0" encoding="utf-8"?>
 <p1510:revInfo xmlns:a="http://schemas.openxmlformats.org/drawingml/2006/main" xmlns:r="http://schemas.openxmlformats.org/officeDocument/2006/relationships" xmlns:p1510="http://schemas.microsoft.com/office/powerpoint/2015/10/main">
   <p1510:revLst>
-    <p1510:client id="{066FDBB8-ACAC-4825-842E-435133CD2304}" v="3" dt="2025-04-19T06:18:07.313"/>
+    <p1510:client id="{066FDBB8-ACAC-4825-842E-435133CD2304}" v="5" dt="2025-04-21T18:05:03.274"/>
   </p1510:revLst>
 </p1510:revInfo>
 </file>
@@ -129,12 +129,12 @@
   <pc:docChgLst>
     <pc:chgData name="Mark Lawley" userId="16677e3de322db55" providerId="LiveId" clId="{066FDBB8-ACAC-4825-842E-435133CD2304}"/>
     <pc:docChg chg="custSel modSld">
-      <pc:chgData name="Mark Lawley" userId="16677e3de322db55" providerId="LiveId" clId="{066FDBB8-ACAC-4825-842E-435133CD2304}" dt="2025-04-19T06:18:18.123" v="66" actId="692"/>
+      <pc:chgData name="Mark Lawley" userId="16677e3de322db55" providerId="LiveId" clId="{066FDBB8-ACAC-4825-842E-435133CD2304}" dt="2025-04-21T18:05:05.776" v="70" actId="1076"/>
       <pc:docMkLst>
         <pc:docMk/>
       </pc:docMkLst>
       <pc:sldChg chg="addSp delSp modSp mod">
-        <pc:chgData name="Mark Lawley" userId="16677e3de322db55" providerId="LiveId" clId="{066FDBB8-ACAC-4825-842E-435133CD2304}" dt="2025-04-19T06:18:18.123" v="66" actId="692"/>
+        <pc:chgData name="Mark Lawley" userId="16677e3de322db55" providerId="LiveId" clId="{066FDBB8-ACAC-4825-842E-435133CD2304}" dt="2025-04-21T18:05:05.776" v="70" actId="1076"/>
         <pc:sldMkLst>
           <pc:docMk/>
           <pc:sldMk cId="2502855908" sldId="257"/>
@@ -171,6 +171,22 @@
             <ac:spMk id="209" creationId="{AE8D23A5-FEED-F283-4D3C-1B367F447303}"/>
           </ac:spMkLst>
         </pc:spChg>
+        <pc:picChg chg="add mod">
+          <ac:chgData name="Mark Lawley" userId="16677e3de322db55" providerId="LiveId" clId="{066FDBB8-ACAC-4825-842E-435133CD2304}" dt="2025-04-21T18:05:03.273" v="69" actId="1076"/>
+          <ac:picMkLst>
+            <pc:docMk/>
+            <pc:sldMk cId="2502855908" sldId="257"/>
+            <ac:picMk id="21" creationId="{E8F5AA38-9386-4A2D-17EA-188FDFB93124}"/>
+          </ac:picMkLst>
+        </pc:picChg>
+        <pc:picChg chg="mod">
+          <ac:chgData name="Mark Lawley" userId="16677e3de322db55" providerId="LiveId" clId="{066FDBB8-ACAC-4825-842E-435133CD2304}" dt="2025-04-21T18:05:05.776" v="70" actId="1076"/>
+          <ac:picMkLst>
+            <pc:docMk/>
+            <pc:sldMk cId="2502855908" sldId="257"/>
+            <ac:picMk id="211" creationId="{A3D97D1C-9669-D193-8313-A3A3AB6C6D16}"/>
+          </ac:picMkLst>
+        </pc:picChg>
         <pc:picChg chg="mod">
           <ac:chgData name="Mark Lawley" userId="16677e3de322db55" providerId="LiveId" clId="{066FDBB8-ACAC-4825-842E-435133CD2304}" dt="2025-04-18T20:00:30.703" v="15" actId="1076"/>
           <ac:picMkLst>
@@ -203,14 +219,6 @@
             <ac:cxnSpMk id="44" creationId="{AE67BF63-50CD-4C0D-0250-EB05C71BA456}"/>
           </ac:cxnSpMkLst>
         </pc:cxnChg>
-        <pc:cxnChg chg="del mod">
-          <ac:chgData name="Mark Lawley" userId="16677e3de322db55" providerId="LiveId" clId="{066FDBB8-ACAC-4825-842E-435133CD2304}" dt="2025-04-18T20:00:12.967" v="14" actId="21"/>
-          <ac:cxnSpMkLst>
-            <pc:docMk/>
-            <pc:sldMk cId="2502855908" sldId="257"/>
-            <ac:cxnSpMk id="50" creationId="{9067A8F7-2A0F-2820-0827-5B2C0F8B9EF6}"/>
-          </ac:cxnSpMkLst>
-        </pc:cxnChg>
         <pc:cxnChg chg="mod">
           <ac:chgData name="Mark Lawley" userId="16677e3de322db55" providerId="LiveId" clId="{066FDBB8-ACAC-4825-842E-435133CD2304}" dt="2025-04-11T13:28:05.818" v="2" actId="14100"/>
           <ac:cxnSpMkLst>
@@ -241,6 +249,14 @@
             <pc:docMk/>
             <pc:sldMk cId="2502855908" sldId="257"/>
             <ac:cxnSpMk id="179" creationId="{B1287BB4-7CFA-4C2A-4B26-BB5D4192EF9E}"/>
+          </ac:cxnSpMkLst>
+        </pc:cxnChg>
+        <pc:cxnChg chg="del mod">
+          <ac:chgData name="Mark Lawley" userId="16677e3de322db55" providerId="LiveId" clId="{066FDBB8-ACAC-4825-842E-435133CD2304}" dt="2025-04-21T18:04:37.184" v="67" actId="21"/>
+          <ac:cxnSpMkLst>
+            <pc:docMk/>
+            <pc:sldMk cId="2502855908" sldId="257"/>
+            <ac:cxnSpMk id="201" creationId="{00D48105-6C12-77D3-CAC8-B7B75635DEB1}"/>
           </ac:cxnSpMkLst>
         </pc:cxnChg>
       </pc:sldChg>
@@ -5581,38 +5597,628 @@
           </a:p>
         </p:txBody>
       </p:sp>
+      <p:sp>
+        <p:nvSpPr>
+          <p:cNvPr id="209" name="TextBox 208">
+            <a:extLst>
+              <a:ext uri="{FF2B5EF4-FFF2-40B4-BE49-F238E27FC236}">
+                <a16:creationId xmlns:a16="http://schemas.microsoft.com/office/drawing/2014/main" id="{AE8D23A5-FEED-F283-4D3C-1B367F447303}"/>
+              </a:ext>
+            </a:extLst>
+          </p:cNvPr>
+          <p:cNvSpPr txBox="1"/>
+          <p:nvPr/>
+        </p:nvSpPr>
+        <p:spPr>
+          <a:xfrm>
+            <a:off x="6830538" y="281731"/>
+            <a:ext cx="1942015" cy="646331"/>
+          </a:xfrm>
+          <a:prstGeom prst="rect">
+            <a:avLst/>
+          </a:prstGeom>
+          <a:noFill/>
+        </p:spPr>
+        <p:txBody>
+          <a:bodyPr wrap="square" rtlCol="0">
+            <a:spAutoFit/>
+          </a:bodyPr>
+          <a:lstStyle/>
+          <a:p>
+            <a:pPr algn="ctr"/>
+            <a:r>
+              <a:rPr lang="en-US"/>
+              <a:t>Google </a:t>
+            </a:r>
+          </a:p>
+          <a:p>
+            <a:pPr algn="ctr"/>
+            <a:r>
+              <a:rPr lang="en-US"/>
+              <a:t>Cloud Scheduler</a:t>
+            </a:r>
+          </a:p>
+        </p:txBody>
+      </p:sp>
+      <p:pic>
+        <p:nvPicPr>
+          <p:cNvPr id="211" name="Picture 210">
+            <a:extLst>
+              <a:ext uri="{FF2B5EF4-FFF2-40B4-BE49-F238E27FC236}">
+                <a16:creationId xmlns:a16="http://schemas.microsoft.com/office/drawing/2014/main" id="{A3D97D1C-9669-D193-8313-A3A3AB6C6D16}"/>
+              </a:ext>
+            </a:extLst>
+          </p:cNvPr>
+          <p:cNvPicPr>
+            <a:picLocks noChangeAspect="1"/>
+          </p:cNvPicPr>
+          <p:nvPr/>
+        </p:nvPicPr>
+        <p:blipFill>
+          <a:blip r:embed="rId3"/>
+          <a:stretch>
+            <a:fillRect/>
+          </a:stretch>
+        </p:blipFill>
+        <p:spPr>
+          <a:xfrm>
+            <a:off x="8656353" y="636898"/>
+            <a:ext cx="605587" cy="605587"/>
+          </a:xfrm>
+          <a:prstGeom prst="rect">
+            <a:avLst/>
+          </a:prstGeom>
+        </p:spPr>
+      </p:pic>
+      <p:pic>
+        <p:nvPicPr>
+          <p:cNvPr id="1028" name="Picture 4" descr="Go SVG and transparent PNG icons | TechIcons">
+            <a:extLst>
+              <a:ext uri="{FF2B5EF4-FFF2-40B4-BE49-F238E27FC236}">
+                <a16:creationId xmlns:a16="http://schemas.microsoft.com/office/drawing/2014/main" id="{9526985B-D203-B4BC-1655-3394796697E5}"/>
+              </a:ext>
+            </a:extLst>
+          </p:cNvPr>
+          <p:cNvPicPr>
+            <a:picLocks noChangeAspect="1" noChangeArrowheads="1"/>
+          </p:cNvPicPr>
+          <p:nvPr/>
+        </p:nvPicPr>
+        <p:blipFill>
+          <a:blip r:embed="rId4">
+            <a:extLst>
+              <a:ext uri="{28A0092B-C50C-407E-A947-70E740481C1C}">
+                <a14:useLocalDpi xmlns:a14="http://schemas.microsoft.com/office/drawing/2010/main" val="0"/>
+              </a:ext>
+            </a:extLst>
+          </a:blip>
+          <a:srcRect/>
+          <a:stretch>
+            <a:fillRect/>
+          </a:stretch>
+        </p:blipFill>
+        <p:spPr bwMode="auto">
+          <a:xfrm>
+            <a:off x="5577351" y="2149284"/>
+            <a:ext cx="437348" cy="437348"/>
+          </a:xfrm>
+          <a:prstGeom prst="rect">
+            <a:avLst/>
+          </a:prstGeom>
+          <a:noFill/>
+          <a:extLst>
+            <a:ext uri="{909E8E84-426E-40DD-AFC4-6F175D3DCCD1}">
+              <a14:hiddenFill xmlns:a14="http://schemas.microsoft.com/office/drawing/2010/main">
+                <a:solidFill>
+                  <a:srgbClr val="FFFFFF"/>
+                </a:solidFill>
+              </a14:hiddenFill>
+            </a:ext>
+          </a:extLst>
+        </p:spPr>
+      </p:pic>
+      <p:pic>
+        <p:nvPicPr>
+          <p:cNvPr id="213" name="Picture 212">
+            <a:extLst>
+              <a:ext uri="{FF2B5EF4-FFF2-40B4-BE49-F238E27FC236}">
+                <a16:creationId xmlns:a16="http://schemas.microsoft.com/office/drawing/2014/main" id="{2E46F99D-C14B-A3F7-DC51-44BDBAC8BD77}"/>
+              </a:ext>
+            </a:extLst>
+          </p:cNvPr>
+          <p:cNvPicPr>
+            <a:picLocks noChangeAspect="1"/>
+          </p:cNvPicPr>
+          <p:nvPr/>
+        </p:nvPicPr>
+        <p:blipFill>
+          <a:blip r:embed="rId5"/>
+          <a:stretch>
+            <a:fillRect/>
+          </a:stretch>
+        </p:blipFill>
+        <p:spPr>
+          <a:xfrm>
+            <a:off x="2503873" y="1741226"/>
+            <a:ext cx="581106" cy="476316"/>
+          </a:xfrm>
+          <a:prstGeom prst="rect">
+            <a:avLst/>
+          </a:prstGeom>
+        </p:spPr>
+      </p:pic>
+      <p:pic>
+        <p:nvPicPr>
+          <p:cNvPr id="215" name="Picture 214">
+            <a:extLst>
+              <a:ext uri="{FF2B5EF4-FFF2-40B4-BE49-F238E27FC236}">
+                <a16:creationId xmlns:a16="http://schemas.microsoft.com/office/drawing/2014/main" id="{7690F4DB-B38E-A7E6-AFD2-2AE5C4C95845}"/>
+              </a:ext>
+            </a:extLst>
+          </p:cNvPr>
+          <p:cNvPicPr>
+            <a:picLocks noChangeAspect="1"/>
+          </p:cNvPicPr>
+          <p:nvPr/>
+        </p:nvPicPr>
+        <p:blipFill>
+          <a:blip r:embed="rId6"/>
+          <a:stretch>
+            <a:fillRect/>
+          </a:stretch>
+        </p:blipFill>
+        <p:spPr>
+          <a:xfrm>
+            <a:off x="4388441" y="3564809"/>
+            <a:ext cx="558482" cy="450528"/>
+          </a:xfrm>
+          <a:prstGeom prst="rect">
+            <a:avLst/>
+          </a:prstGeom>
+        </p:spPr>
+      </p:pic>
+      <p:pic>
+        <p:nvPicPr>
+          <p:cNvPr id="217" name="Picture 216">
+            <a:extLst>
+              <a:ext uri="{FF2B5EF4-FFF2-40B4-BE49-F238E27FC236}">
+                <a16:creationId xmlns:a16="http://schemas.microsoft.com/office/drawing/2014/main" id="{0FF8DDED-E4AD-C4A2-E6E7-B91CCFC0FAB8}"/>
+              </a:ext>
+            </a:extLst>
+          </p:cNvPr>
+          <p:cNvPicPr>
+            <a:picLocks noChangeAspect="1"/>
+          </p:cNvPicPr>
+          <p:nvPr/>
+        </p:nvPicPr>
+        <p:blipFill>
+          <a:blip r:embed="rId7"/>
+          <a:stretch>
+            <a:fillRect/>
+          </a:stretch>
+        </p:blipFill>
+        <p:spPr>
+          <a:xfrm>
+            <a:off x="8382638" y="2359316"/>
+            <a:ext cx="470667" cy="404189"/>
+          </a:xfrm>
+          <a:prstGeom prst="rect">
+            <a:avLst/>
+          </a:prstGeom>
+        </p:spPr>
+      </p:pic>
+      <p:pic>
+        <p:nvPicPr>
+          <p:cNvPr id="219" name="Picture 218">
+            <a:extLst>
+              <a:ext uri="{FF2B5EF4-FFF2-40B4-BE49-F238E27FC236}">
+                <a16:creationId xmlns:a16="http://schemas.microsoft.com/office/drawing/2014/main" id="{BF3EF89E-8A8A-CBF1-3FDA-B1DCEE37B60A}"/>
+              </a:ext>
+            </a:extLst>
+          </p:cNvPr>
+          <p:cNvPicPr>
+            <a:picLocks noChangeAspect="1"/>
+          </p:cNvPicPr>
+          <p:nvPr/>
+        </p:nvPicPr>
+        <p:blipFill>
+          <a:blip r:embed="rId8"/>
+          <a:stretch>
+            <a:fillRect/>
+          </a:stretch>
+        </p:blipFill>
+        <p:spPr>
+          <a:xfrm>
+            <a:off x="9327643" y="2458356"/>
+            <a:ext cx="964848" cy="450528"/>
+          </a:xfrm>
+          <a:prstGeom prst="rect">
+            <a:avLst/>
+          </a:prstGeom>
+        </p:spPr>
+      </p:pic>
+      <p:pic>
+        <p:nvPicPr>
+          <p:cNvPr id="220" name="Picture 219">
+            <a:extLst>
+              <a:ext uri="{FF2B5EF4-FFF2-40B4-BE49-F238E27FC236}">
+                <a16:creationId xmlns:a16="http://schemas.microsoft.com/office/drawing/2014/main" id="{34659A21-EBAA-A56B-D790-EFC3CFCB500C}"/>
+              </a:ext>
+            </a:extLst>
+          </p:cNvPr>
+          <p:cNvPicPr>
+            <a:picLocks noChangeAspect="1"/>
+          </p:cNvPicPr>
+          <p:nvPr/>
+        </p:nvPicPr>
+        <p:blipFill>
+          <a:blip r:embed="rId8"/>
+          <a:stretch>
+            <a:fillRect/>
+          </a:stretch>
+        </p:blipFill>
+        <p:spPr>
+          <a:xfrm>
+            <a:off x="9436350" y="5390464"/>
+            <a:ext cx="964848" cy="450528"/>
+          </a:xfrm>
+          <a:prstGeom prst="rect">
+            <a:avLst/>
+          </a:prstGeom>
+        </p:spPr>
+      </p:pic>
+      <p:pic>
+        <p:nvPicPr>
+          <p:cNvPr id="222" name="Picture 221">
+            <a:extLst>
+              <a:ext uri="{FF2B5EF4-FFF2-40B4-BE49-F238E27FC236}">
+                <a16:creationId xmlns:a16="http://schemas.microsoft.com/office/drawing/2014/main" id="{C2C01B17-370E-30A8-C15F-B75375DE870E}"/>
+              </a:ext>
+            </a:extLst>
+          </p:cNvPr>
+          <p:cNvPicPr>
+            <a:picLocks noChangeAspect="1"/>
+          </p:cNvPicPr>
+          <p:nvPr/>
+        </p:nvPicPr>
+        <p:blipFill>
+          <a:blip r:embed="rId9"/>
+          <a:stretch>
+            <a:fillRect/>
+          </a:stretch>
+        </p:blipFill>
+        <p:spPr>
+          <a:xfrm>
+            <a:off x="9591820" y="3885698"/>
+            <a:ext cx="776342" cy="467590"/>
+          </a:xfrm>
+          <a:prstGeom prst="rect">
+            <a:avLst/>
+          </a:prstGeom>
+        </p:spPr>
+      </p:pic>
+      <p:pic>
+        <p:nvPicPr>
+          <p:cNvPr id="224" name="Picture 223">
+            <a:extLst>
+              <a:ext uri="{FF2B5EF4-FFF2-40B4-BE49-F238E27FC236}">
+                <a16:creationId xmlns:a16="http://schemas.microsoft.com/office/drawing/2014/main" id="{FFC86220-8794-C256-7C8C-DEB47F017D7C}"/>
+              </a:ext>
+            </a:extLst>
+          </p:cNvPr>
+          <p:cNvPicPr>
+            <a:picLocks noChangeAspect="1"/>
+          </p:cNvPicPr>
+          <p:nvPr/>
+        </p:nvPicPr>
+        <p:blipFill>
+          <a:blip r:embed="rId10"/>
+          <a:stretch>
+            <a:fillRect/>
+          </a:stretch>
+        </p:blipFill>
+        <p:spPr>
+          <a:xfrm>
+            <a:off x="10775292" y="3885698"/>
+            <a:ext cx="511040" cy="472471"/>
+          </a:xfrm>
+          <a:prstGeom prst="rect">
+            <a:avLst/>
+          </a:prstGeom>
+        </p:spPr>
+      </p:pic>
+      <p:pic>
+        <p:nvPicPr>
+          <p:cNvPr id="251" name="Picture 12" descr="GitHub Logo and symbol, meaning ...">
+            <a:extLst>
+              <a:ext uri="{FF2B5EF4-FFF2-40B4-BE49-F238E27FC236}">
+                <a16:creationId xmlns:a16="http://schemas.microsoft.com/office/drawing/2014/main" id="{247D1354-9DFA-2FFA-BF9F-3156692BC9A4}"/>
+              </a:ext>
+            </a:extLst>
+          </p:cNvPr>
+          <p:cNvPicPr>
+            <a:picLocks noChangeAspect="1" noChangeArrowheads="1"/>
+          </p:cNvPicPr>
+          <p:nvPr/>
+        </p:nvPicPr>
+        <p:blipFill>
+          <a:blip r:embed="rId11">
+            <a:extLst>
+              <a:ext uri="{28A0092B-C50C-407E-A947-70E740481C1C}">
+                <a14:useLocalDpi xmlns:a14="http://schemas.microsoft.com/office/drawing/2010/main" val="0"/>
+              </a:ext>
+            </a:extLst>
+          </a:blip>
+          <a:srcRect/>
+          <a:stretch>
+            <a:fillRect/>
+          </a:stretch>
+        </p:blipFill>
+        <p:spPr bwMode="auto">
+          <a:xfrm>
+            <a:off x="82891" y="5983652"/>
+            <a:ext cx="981588" cy="549689"/>
+          </a:xfrm>
+          <a:prstGeom prst="rect">
+            <a:avLst/>
+          </a:prstGeom>
+          <a:noFill/>
+          <a:extLst>
+            <a:ext uri="{909E8E84-426E-40DD-AFC4-6F175D3DCCD1}">
+              <a14:hiddenFill xmlns:a14="http://schemas.microsoft.com/office/drawing/2010/main">
+                <a:solidFill>
+                  <a:srgbClr val="FFFFFF"/>
+                </a:solidFill>
+              </a14:hiddenFill>
+            </a:ext>
+          </a:extLst>
+        </p:spPr>
+      </p:pic>
+      <p:pic>
+        <p:nvPicPr>
+          <p:cNvPr id="252" name="Picture 10" descr="Docker Vector Logo - Download Free SVG ...">
+            <a:extLst>
+              <a:ext uri="{FF2B5EF4-FFF2-40B4-BE49-F238E27FC236}">
+                <a16:creationId xmlns:a16="http://schemas.microsoft.com/office/drawing/2014/main" id="{BCA84285-42F4-0F80-ED02-BB59B35BC5A1}"/>
+              </a:ext>
+            </a:extLst>
+          </p:cNvPr>
+          <p:cNvPicPr>
+            <a:picLocks noChangeAspect="1" noChangeArrowheads="1"/>
+          </p:cNvPicPr>
+          <p:nvPr/>
+        </p:nvPicPr>
+        <p:blipFill>
+          <a:blip r:embed="rId12">
+            <a:extLst>
+              <a:ext uri="{28A0092B-C50C-407E-A947-70E740481C1C}">
+                <a14:useLocalDpi xmlns:a14="http://schemas.microsoft.com/office/drawing/2010/main" val="0"/>
+              </a:ext>
+            </a:extLst>
+          </a:blip>
+          <a:srcRect/>
+          <a:stretch>
+            <a:fillRect/>
+          </a:stretch>
+        </p:blipFill>
+        <p:spPr bwMode="auto">
+          <a:xfrm>
+            <a:off x="1253473" y="6109661"/>
+            <a:ext cx="1650124" cy="423680"/>
+          </a:xfrm>
+          <a:prstGeom prst="rect">
+            <a:avLst/>
+          </a:prstGeom>
+          <a:noFill/>
+          <a:extLst>
+            <a:ext uri="{909E8E84-426E-40DD-AFC4-6F175D3DCCD1}">
+              <a14:hiddenFill xmlns:a14="http://schemas.microsoft.com/office/drawing/2010/main">
+                <a:solidFill>
+                  <a:srgbClr val="FFFFFF"/>
+                </a:solidFill>
+              </a14:hiddenFill>
+            </a:ext>
+          </a:extLst>
+        </p:spPr>
+      </p:pic>
+      <p:pic>
+        <p:nvPicPr>
+          <p:cNvPr id="253" name="Picture 32" descr="What is Rest -A Simple Explanation for ...">
+            <a:extLst>
+              <a:ext uri="{FF2B5EF4-FFF2-40B4-BE49-F238E27FC236}">
+                <a16:creationId xmlns:a16="http://schemas.microsoft.com/office/drawing/2014/main" id="{8B907952-32FA-F16E-F675-53DA169031AD}"/>
+              </a:ext>
+            </a:extLst>
+          </p:cNvPr>
+          <p:cNvPicPr>
+            <a:picLocks noChangeAspect="1" noChangeArrowheads="1"/>
+          </p:cNvPicPr>
+          <p:nvPr/>
+        </p:nvPicPr>
+        <p:blipFill>
+          <a:blip r:embed="rId13">
+            <a:extLst>
+              <a:ext uri="{28A0092B-C50C-407E-A947-70E740481C1C}">
+                <a14:useLocalDpi xmlns:a14="http://schemas.microsoft.com/office/drawing/2010/main" val="0"/>
+              </a:ext>
+            </a:extLst>
+          </a:blip>
+          <a:srcRect/>
+          <a:stretch>
+            <a:fillRect/>
+          </a:stretch>
+        </p:blipFill>
+        <p:spPr bwMode="auto">
+          <a:xfrm>
+            <a:off x="5198204" y="985984"/>
+            <a:ext cx="829802" cy="587388"/>
+          </a:xfrm>
+          <a:prstGeom prst="rect">
+            <a:avLst/>
+          </a:prstGeom>
+          <a:noFill/>
+          <a:extLst>
+            <a:ext uri="{909E8E84-426E-40DD-AFC4-6F175D3DCCD1}">
+              <a14:hiddenFill xmlns:a14="http://schemas.microsoft.com/office/drawing/2010/main">
+                <a:solidFill>
+                  <a:srgbClr val="FFFFFF"/>
+                </a:solidFill>
+              </a14:hiddenFill>
+            </a:ext>
+          </a:extLst>
+        </p:spPr>
+      </p:pic>
+      <p:pic>
+        <p:nvPicPr>
+          <p:cNvPr id="255" name="Picture 254">
+            <a:extLst>
+              <a:ext uri="{FF2B5EF4-FFF2-40B4-BE49-F238E27FC236}">
+                <a16:creationId xmlns:a16="http://schemas.microsoft.com/office/drawing/2014/main" id="{3216D250-25E4-2B76-E568-DC9CDDEEE71C}"/>
+              </a:ext>
+            </a:extLst>
+          </p:cNvPr>
+          <p:cNvPicPr>
+            <a:picLocks noChangeAspect="1"/>
+          </p:cNvPicPr>
+          <p:nvPr/>
+        </p:nvPicPr>
+        <p:blipFill>
+          <a:blip r:embed="rId14"/>
+          <a:stretch>
+            <a:fillRect/>
+          </a:stretch>
+        </p:blipFill>
+        <p:spPr>
+          <a:xfrm>
+            <a:off x="11117156" y="159860"/>
+            <a:ext cx="1074844" cy="720566"/>
+          </a:xfrm>
+          <a:prstGeom prst="rect">
+            <a:avLst/>
+          </a:prstGeom>
+        </p:spPr>
+      </p:pic>
+      <p:pic>
+        <p:nvPicPr>
+          <p:cNvPr id="1032" name="Picture 8" descr="Google Container Registry - OpsMx">
+            <a:extLst>
+              <a:ext uri="{FF2B5EF4-FFF2-40B4-BE49-F238E27FC236}">
+                <a16:creationId xmlns:a16="http://schemas.microsoft.com/office/drawing/2014/main" id="{4EFB94E7-A311-B2CA-2419-7F1171667EC6}"/>
+              </a:ext>
+            </a:extLst>
+          </p:cNvPr>
+          <p:cNvPicPr>
+            <a:picLocks noChangeAspect="1" noChangeArrowheads="1"/>
+          </p:cNvPicPr>
+          <p:nvPr/>
+        </p:nvPicPr>
+        <p:blipFill>
+          <a:blip r:embed="rId15">
+            <a:extLst>
+              <a:ext uri="{28A0092B-C50C-407E-A947-70E740481C1C}">
+                <a14:useLocalDpi xmlns:a14="http://schemas.microsoft.com/office/drawing/2010/main" val="0"/>
+              </a:ext>
+            </a:extLst>
+          </a:blip>
+          <a:srcRect/>
+          <a:stretch>
+            <a:fillRect/>
+          </a:stretch>
+        </p:blipFill>
+        <p:spPr bwMode="auto">
+          <a:xfrm>
+            <a:off x="3173389" y="5912002"/>
+            <a:ext cx="1176370" cy="714808"/>
+          </a:xfrm>
+          <a:prstGeom prst="rect">
+            <a:avLst/>
+          </a:prstGeom>
+          <a:noFill/>
+          <a:extLst>
+            <a:ext uri="{909E8E84-426E-40DD-AFC4-6F175D3DCCD1}">
+              <a14:hiddenFill xmlns:a14="http://schemas.microsoft.com/office/drawing/2010/main">
+                <a:solidFill>
+                  <a:srgbClr val="FFFFFF"/>
+                </a:solidFill>
+              </a14:hiddenFill>
+            </a:ext>
+          </a:extLst>
+        </p:spPr>
+      </p:pic>
+      <p:pic>
+        <p:nvPicPr>
+          <p:cNvPr id="1034" name="Picture 10" descr="Google Cloud Run Jobs vs. Cloud ...">
+            <a:extLst>
+              <a:ext uri="{FF2B5EF4-FFF2-40B4-BE49-F238E27FC236}">
+                <a16:creationId xmlns:a16="http://schemas.microsoft.com/office/drawing/2014/main" id="{0DA8AE67-0386-5A5B-DA01-1DC12D202B6C}"/>
+              </a:ext>
+            </a:extLst>
+          </p:cNvPr>
+          <p:cNvPicPr>
+            <a:picLocks noChangeAspect="1" noChangeArrowheads="1"/>
+          </p:cNvPicPr>
+          <p:nvPr/>
+        </p:nvPicPr>
+        <p:blipFill>
+          <a:blip r:embed="rId16">
+            <a:extLst>
+              <a:ext uri="{28A0092B-C50C-407E-A947-70E740481C1C}">
+                <a14:useLocalDpi xmlns:a14="http://schemas.microsoft.com/office/drawing/2010/main" val="0"/>
+              </a:ext>
+            </a:extLst>
+          </a:blip>
+          <a:srcRect/>
+          <a:stretch>
+            <a:fillRect/>
+          </a:stretch>
+        </p:blipFill>
+        <p:spPr bwMode="auto">
+          <a:xfrm>
+            <a:off x="4559745" y="5962225"/>
+            <a:ext cx="1345092" cy="718551"/>
+          </a:xfrm>
+          <a:prstGeom prst="rect">
+            <a:avLst/>
+          </a:prstGeom>
+          <a:noFill/>
+          <a:extLst>
+            <a:ext uri="{909E8E84-426E-40DD-AFC4-6F175D3DCCD1}">
+              <a14:hiddenFill xmlns:a14="http://schemas.microsoft.com/office/drawing/2010/main">
+                <a:solidFill>
+                  <a:srgbClr val="FFFFFF"/>
+                </a:solidFill>
+              </a14:hiddenFill>
+            </a:ext>
+          </a:extLst>
+        </p:spPr>
+      </p:pic>
       <p:cxnSp>
         <p:nvCxnSpPr>
-          <p:cNvPr id="201" name="Connector: Elbow 200">
-            <a:extLst>
-              <a:ext uri="{FF2B5EF4-FFF2-40B4-BE49-F238E27FC236}">
-                <a16:creationId xmlns:a16="http://schemas.microsoft.com/office/drawing/2014/main" id="{00D48105-6C12-77D3-CAC8-B7B75635DEB1}"/>
+          <p:cNvPr id="1024" name="Straight Arrow Connector 1023">
+            <a:extLst>
+              <a:ext uri="{FF2B5EF4-FFF2-40B4-BE49-F238E27FC236}">
+                <a16:creationId xmlns:a16="http://schemas.microsoft.com/office/drawing/2014/main" id="{83178F21-FC71-A69B-B526-B5731487E8F6}"/>
               </a:ext>
             </a:extLst>
           </p:cNvPr>
           <p:cNvCxnSpPr>
             <a:cxnSpLocks/>
-            <a:stCxn id="23" idx="3"/>
-            <a:endCxn id="181" idx="3"/>
           </p:cNvCxnSpPr>
           <p:nvPr/>
         </p:nvCxnSpPr>
         <p:spPr>
-          <a:xfrm>
-            <a:off x="8584438" y="1918598"/>
-            <a:ext cx="3277360" cy="2799039"/>
-          </a:xfrm>
-          <a:prstGeom prst="bentConnector3">
-            <a:avLst>
-              <a:gd name="adj1" fmla="val 106975"/>
-            </a:avLst>
+          <a:xfrm flipV="1">
+            <a:off x="10693361" y="5040802"/>
+            <a:ext cx="0" cy="800190"/>
+          </a:xfrm>
+          <a:prstGeom prst="straightConnector1">
+            <a:avLst/>
           </a:prstGeom>
-          <a:ln w="25400" cap="rnd">
+          <a:ln w="31750" cap="rnd" cmpd="sng">
             <a:solidFill>
               <a:srgbClr val="FF0000"/>
             </a:solidFill>
             <a:prstDash val="sysDot"/>
-            <a:headEnd type="none"/>
             <a:tailEnd type="stealth" w="lg" len="lg"/>
           </a:ln>
         </p:spPr>
@@ -5633,10 +6239,10 @@
       </p:cxnSp>
       <p:sp>
         <p:nvSpPr>
-          <p:cNvPr id="209" name="TextBox 208">
-            <a:extLst>
-              <a:ext uri="{FF2B5EF4-FFF2-40B4-BE49-F238E27FC236}">
-                <a16:creationId xmlns:a16="http://schemas.microsoft.com/office/drawing/2014/main" id="{AE8D23A5-FEED-F283-4D3C-1B367F447303}"/>
+          <p:cNvPr id="1027" name="TextBox 1026">
+            <a:extLst>
+              <a:ext uri="{FF2B5EF4-FFF2-40B4-BE49-F238E27FC236}">
+                <a16:creationId xmlns:a16="http://schemas.microsoft.com/office/drawing/2014/main" id="{B846AC75-D5CC-7458-1613-AC77B7EF97B7}"/>
               </a:ext>
             </a:extLst>
           </p:cNvPr>
@@ -5645,13 +6251,16 @@
         </p:nvSpPr>
         <p:spPr>
           <a:xfrm>
-            <a:off x="6830538" y="281731"/>
-            <a:ext cx="1942015" cy="646331"/>
+            <a:off x="10710131" y="5194661"/>
+            <a:ext cx="1221357" cy="646331"/>
           </a:xfrm>
           <a:prstGeom prst="rect">
             <a:avLst/>
           </a:prstGeom>
           <a:noFill/>
+          <a:ln w="25400">
+            <a:noFill/>
+          </a:ln>
         </p:spPr>
         <p:txBody>
           <a:bodyPr wrap="square" rtlCol="0">
@@ -5662,576 +6271,17 @@
             <a:pPr algn="ctr"/>
             <a:r>
               <a:rPr lang="en-US"/>
-              <a:t>Google </a:t>
-            </a:r>
-          </a:p>
-          <a:p>
-            <a:pPr algn="ctr"/>
-            <a:r>
-              <a:rPr lang="en-US"/>
-              <a:t>Cloud Scheduler</a:t>
-            </a:r>
-          </a:p>
-        </p:txBody>
-      </p:sp>
-      <p:pic>
-        <p:nvPicPr>
-          <p:cNvPr id="211" name="Picture 210">
-            <a:extLst>
-              <a:ext uri="{FF2B5EF4-FFF2-40B4-BE49-F238E27FC236}">
-                <a16:creationId xmlns:a16="http://schemas.microsoft.com/office/drawing/2014/main" id="{A3D97D1C-9669-D193-8313-A3A3AB6C6D16}"/>
-              </a:ext>
-            </a:extLst>
-          </p:cNvPr>
-          <p:cNvPicPr>
-            <a:picLocks noChangeAspect="1"/>
-          </p:cNvPicPr>
-          <p:nvPr/>
-        </p:nvPicPr>
-        <p:blipFill>
-          <a:blip r:embed="rId3"/>
-          <a:stretch>
-            <a:fillRect/>
-          </a:stretch>
-        </p:blipFill>
-        <p:spPr>
-          <a:xfrm>
-            <a:off x="8684607" y="1089645"/>
-            <a:ext cx="605587" cy="605587"/>
-          </a:xfrm>
-          <a:prstGeom prst="rect">
-            <a:avLst/>
-          </a:prstGeom>
-        </p:spPr>
-      </p:pic>
-      <p:pic>
-        <p:nvPicPr>
-          <p:cNvPr id="1028" name="Picture 4" descr="Go SVG and transparent PNG icons | TechIcons">
-            <a:extLst>
-              <a:ext uri="{FF2B5EF4-FFF2-40B4-BE49-F238E27FC236}">
-                <a16:creationId xmlns:a16="http://schemas.microsoft.com/office/drawing/2014/main" id="{9526985B-D203-B4BC-1655-3394796697E5}"/>
-              </a:ext>
-            </a:extLst>
-          </p:cNvPr>
-          <p:cNvPicPr>
-            <a:picLocks noChangeAspect="1" noChangeArrowheads="1"/>
-          </p:cNvPicPr>
-          <p:nvPr/>
-        </p:nvPicPr>
-        <p:blipFill>
-          <a:blip r:embed="rId4">
-            <a:extLst>
-              <a:ext uri="{28A0092B-C50C-407E-A947-70E740481C1C}">
-                <a14:useLocalDpi xmlns:a14="http://schemas.microsoft.com/office/drawing/2010/main" val="0"/>
-              </a:ext>
-            </a:extLst>
-          </a:blip>
-          <a:srcRect/>
-          <a:stretch>
-            <a:fillRect/>
-          </a:stretch>
-        </p:blipFill>
-        <p:spPr bwMode="auto">
-          <a:xfrm>
-            <a:off x="5577351" y="2149284"/>
-            <a:ext cx="437348" cy="437348"/>
-          </a:xfrm>
-          <a:prstGeom prst="rect">
-            <a:avLst/>
-          </a:prstGeom>
-          <a:noFill/>
-          <a:extLst>
-            <a:ext uri="{909E8E84-426E-40DD-AFC4-6F175D3DCCD1}">
-              <a14:hiddenFill xmlns:a14="http://schemas.microsoft.com/office/drawing/2010/main">
-                <a:solidFill>
-                  <a:srgbClr val="FFFFFF"/>
-                </a:solidFill>
-              </a14:hiddenFill>
-            </a:ext>
-          </a:extLst>
-        </p:spPr>
-      </p:pic>
-      <p:pic>
-        <p:nvPicPr>
-          <p:cNvPr id="213" name="Picture 212">
-            <a:extLst>
-              <a:ext uri="{FF2B5EF4-FFF2-40B4-BE49-F238E27FC236}">
-                <a16:creationId xmlns:a16="http://schemas.microsoft.com/office/drawing/2014/main" id="{2E46F99D-C14B-A3F7-DC51-44BDBAC8BD77}"/>
-              </a:ext>
-            </a:extLst>
-          </p:cNvPr>
-          <p:cNvPicPr>
-            <a:picLocks noChangeAspect="1"/>
-          </p:cNvPicPr>
-          <p:nvPr/>
-        </p:nvPicPr>
-        <p:blipFill>
-          <a:blip r:embed="rId5"/>
-          <a:stretch>
-            <a:fillRect/>
-          </a:stretch>
-        </p:blipFill>
-        <p:spPr>
-          <a:xfrm>
-            <a:off x="2503873" y="1741226"/>
-            <a:ext cx="581106" cy="476316"/>
-          </a:xfrm>
-          <a:prstGeom prst="rect">
-            <a:avLst/>
-          </a:prstGeom>
-        </p:spPr>
-      </p:pic>
-      <p:pic>
-        <p:nvPicPr>
-          <p:cNvPr id="215" name="Picture 214">
-            <a:extLst>
-              <a:ext uri="{FF2B5EF4-FFF2-40B4-BE49-F238E27FC236}">
-                <a16:creationId xmlns:a16="http://schemas.microsoft.com/office/drawing/2014/main" id="{7690F4DB-B38E-A7E6-AFD2-2AE5C4C95845}"/>
-              </a:ext>
-            </a:extLst>
-          </p:cNvPr>
-          <p:cNvPicPr>
-            <a:picLocks noChangeAspect="1"/>
-          </p:cNvPicPr>
-          <p:nvPr/>
-        </p:nvPicPr>
-        <p:blipFill>
-          <a:blip r:embed="rId6"/>
-          <a:stretch>
-            <a:fillRect/>
-          </a:stretch>
-        </p:blipFill>
-        <p:spPr>
-          <a:xfrm>
-            <a:off x="4388441" y="3564809"/>
-            <a:ext cx="558482" cy="450528"/>
-          </a:xfrm>
-          <a:prstGeom prst="rect">
-            <a:avLst/>
-          </a:prstGeom>
-        </p:spPr>
-      </p:pic>
-      <p:pic>
-        <p:nvPicPr>
-          <p:cNvPr id="217" name="Picture 216">
-            <a:extLst>
-              <a:ext uri="{FF2B5EF4-FFF2-40B4-BE49-F238E27FC236}">
-                <a16:creationId xmlns:a16="http://schemas.microsoft.com/office/drawing/2014/main" id="{0FF8DDED-E4AD-C4A2-E6E7-B91CCFC0FAB8}"/>
-              </a:ext>
-            </a:extLst>
-          </p:cNvPr>
-          <p:cNvPicPr>
-            <a:picLocks noChangeAspect="1"/>
-          </p:cNvPicPr>
-          <p:nvPr/>
-        </p:nvPicPr>
-        <p:blipFill>
-          <a:blip r:embed="rId7"/>
-          <a:stretch>
-            <a:fillRect/>
-          </a:stretch>
-        </p:blipFill>
-        <p:spPr>
-          <a:xfrm>
-            <a:off x="8382638" y="2359316"/>
-            <a:ext cx="470667" cy="404189"/>
-          </a:xfrm>
-          <a:prstGeom prst="rect">
-            <a:avLst/>
-          </a:prstGeom>
-        </p:spPr>
-      </p:pic>
-      <p:pic>
-        <p:nvPicPr>
-          <p:cNvPr id="219" name="Picture 218">
-            <a:extLst>
-              <a:ext uri="{FF2B5EF4-FFF2-40B4-BE49-F238E27FC236}">
-                <a16:creationId xmlns:a16="http://schemas.microsoft.com/office/drawing/2014/main" id="{BF3EF89E-8A8A-CBF1-3FDA-B1DCEE37B60A}"/>
-              </a:ext>
-            </a:extLst>
-          </p:cNvPr>
-          <p:cNvPicPr>
-            <a:picLocks noChangeAspect="1"/>
-          </p:cNvPicPr>
-          <p:nvPr/>
-        </p:nvPicPr>
-        <p:blipFill>
-          <a:blip r:embed="rId8"/>
-          <a:stretch>
-            <a:fillRect/>
-          </a:stretch>
-        </p:blipFill>
-        <p:spPr>
-          <a:xfrm>
-            <a:off x="9327643" y="2458356"/>
-            <a:ext cx="964848" cy="450528"/>
-          </a:xfrm>
-          <a:prstGeom prst="rect">
-            <a:avLst/>
-          </a:prstGeom>
-        </p:spPr>
-      </p:pic>
-      <p:pic>
-        <p:nvPicPr>
-          <p:cNvPr id="220" name="Picture 219">
-            <a:extLst>
-              <a:ext uri="{FF2B5EF4-FFF2-40B4-BE49-F238E27FC236}">
-                <a16:creationId xmlns:a16="http://schemas.microsoft.com/office/drawing/2014/main" id="{34659A21-EBAA-A56B-D790-EFC3CFCB500C}"/>
-              </a:ext>
-            </a:extLst>
-          </p:cNvPr>
-          <p:cNvPicPr>
-            <a:picLocks noChangeAspect="1"/>
-          </p:cNvPicPr>
-          <p:nvPr/>
-        </p:nvPicPr>
-        <p:blipFill>
-          <a:blip r:embed="rId8"/>
-          <a:stretch>
-            <a:fillRect/>
-          </a:stretch>
-        </p:blipFill>
-        <p:spPr>
-          <a:xfrm>
-            <a:off x="9436350" y="5390464"/>
-            <a:ext cx="964848" cy="450528"/>
-          </a:xfrm>
-          <a:prstGeom prst="rect">
-            <a:avLst/>
-          </a:prstGeom>
-        </p:spPr>
-      </p:pic>
-      <p:pic>
-        <p:nvPicPr>
-          <p:cNvPr id="222" name="Picture 221">
-            <a:extLst>
-              <a:ext uri="{FF2B5EF4-FFF2-40B4-BE49-F238E27FC236}">
-                <a16:creationId xmlns:a16="http://schemas.microsoft.com/office/drawing/2014/main" id="{C2C01B17-370E-30A8-C15F-B75375DE870E}"/>
-              </a:ext>
-            </a:extLst>
-          </p:cNvPr>
-          <p:cNvPicPr>
-            <a:picLocks noChangeAspect="1"/>
-          </p:cNvPicPr>
-          <p:nvPr/>
-        </p:nvPicPr>
-        <p:blipFill>
-          <a:blip r:embed="rId9"/>
-          <a:stretch>
-            <a:fillRect/>
-          </a:stretch>
-        </p:blipFill>
-        <p:spPr>
-          <a:xfrm>
-            <a:off x="9591820" y="3885698"/>
-            <a:ext cx="776342" cy="467590"/>
-          </a:xfrm>
-          <a:prstGeom prst="rect">
-            <a:avLst/>
-          </a:prstGeom>
-        </p:spPr>
-      </p:pic>
-      <p:pic>
-        <p:nvPicPr>
-          <p:cNvPr id="224" name="Picture 223">
-            <a:extLst>
-              <a:ext uri="{FF2B5EF4-FFF2-40B4-BE49-F238E27FC236}">
-                <a16:creationId xmlns:a16="http://schemas.microsoft.com/office/drawing/2014/main" id="{FFC86220-8794-C256-7C8C-DEB47F017D7C}"/>
-              </a:ext>
-            </a:extLst>
-          </p:cNvPr>
-          <p:cNvPicPr>
-            <a:picLocks noChangeAspect="1"/>
-          </p:cNvPicPr>
-          <p:nvPr/>
-        </p:nvPicPr>
-        <p:blipFill>
-          <a:blip r:embed="rId10"/>
-          <a:stretch>
-            <a:fillRect/>
-          </a:stretch>
-        </p:blipFill>
-        <p:spPr>
-          <a:xfrm>
-            <a:off x="10775292" y="3885698"/>
-            <a:ext cx="511040" cy="472471"/>
-          </a:xfrm>
-          <a:prstGeom prst="rect">
-            <a:avLst/>
-          </a:prstGeom>
-        </p:spPr>
-      </p:pic>
-      <p:pic>
-        <p:nvPicPr>
-          <p:cNvPr id="251" name="Picture 12" descr="GitHub Logo and symbol, meaning ...">
-            <a:extLst>
-              <a:ext uri="{FF2B5EF4-FFF2-40B4-BE49-F238E27FC236}">
-                <a16:creationId xmlns:a16="http://schemas.microsoft.com/office/drawing/2014/main" id="{247D1354-9DFA-2FFA-BF9F-3156692BC9A4}"/>
-              </a:ext>
-            </a:extLst>
-          </p:cNvPr>
-          <p:cNvPicPr>
-            <a:picLocks noChangeAspect="1" noChangeArrowheads="1"/>
-          </p:cNvPicPr>
-          <p:nvPr/>
-        </p:nvPicPr>
-        <p:blipFill>
-          <a:blip r:embed="rId11">
-            <a:extLst>
-              <a:ext uri="{28A0092B-C50C-407E-A947-70E740481C1C}">
-                <a14:useLocalDpi xmlns:a14="http://schemas.microsoft.com/office/drawing/2010/main" val="0"/>
-              </a:ext>
-            </a:extLst>
-          </a:blip>
-          <a:srcRect/>
-          <a:stretch>
-            <a:fillRect/>
-          </a:stretch>
-        </p:blipFill>
-        <p:spPr bwMode="auto">
-          <a:xfrm>
-            <a:off x="82891" y="5983652"/>
-            <a:ext cx="981588" cy="549689"/>
-          </a:xfrm>
-          <a:prstGeom prst="rect">
-            <a:avLst/>
-          </a:prstGeom>
-          <a:noFill/>
-          <a:extLst>
-            <a:ext uri="{909E8E84-426E-40DD-AFC4-6F175D3DCCD1}">
-              <a14:hiddenFill xmlns:a14="http://schemas.microsoft.com/office/drawing/2010/main">
-                <a:solidFill>
-                  <a:srgbClr val="FFFFFF"/>
-                </a:solidFill>
-              </a14:hiddenFill>
-            </a:ext>
-          </a:extLst>
-        </p:spPr>
-      </p:pic>
-      <p:pic>
-        <p:nvPicPr>
-          <p:cNvPr id="252" name="Picture 10" descr="Docker Vector Logo - Download Free SVG ...">
-            <a:extLst>
-              <a:ext uri="{FF2B5EF4-FFF2-40B4-BE49-F238E27FC236}">
-                <a16:creationId xmlns:a16="http://schemas.microsoft.com/office/drawing/2014/main" id="{BCA84285-42F4-0F80-ED02-BB59B35BC5A1}"/>
-              </a:ext>
-            </a:extLst>
-          </p:cNvPr>
-          <p:cNvPicPr>
-            <a:picLocks noChangeAspect="1" noChangeArrowheads="1"/>
-          </p:cNvPicPr>
-          <p:nvPr/>
-        </p:nvPicPr>
-        <p:blipFill>
-          <a:blip r:embed="rId12">
-            <a:extLst>
-              <a:ext uri="{28A0092B-C50C-407E-A947-70E740481C1C}">
-                <a14:useLocalDpi xmlns:a14="http://schemas.microsoft.com/office/drawing/2010/main" val="0"/>
-              </a:ext>
-            </a:extLst>
-          </a:blip>
-          <a:srcRect/>
-          <a:stretch>
-            <a:fillRect/>
-          </a:stretch>
-        </p:blipFill>
-        <p:spPr bwMode="auto">
-          <a:xfrm>
-            <a:off x="1253473" y="6109661"/>
-            <a:ext cx="1650124" cy="423680"/>
-          </a:xfrm>
-          <a:prstGeom prst="rect">
-            <a:avLst/>
-          </a:prstGeom>
-          <a:noFill/>
-          <a:extLst>
-            <a:ext uri="{909E8E84-426E-40DD-AFC4-6F175D3DCCD1}">
-              <a14:hiddenFill xmlns:a14="http://schemas.microsoft.com/office/drawing/2010/main">
-                <a:solidFill>
-                  <a:srgbClr val="FFFFFF"/>
-                </a:solidFill>
-              </a14:hiddenFill>
-            </a:ext>
-          </a:extLst>
-        </p:spPr>
-      </p:pic>
-      <p:pic>
-        <p:nvPicPr>
-          <p:cNvPr id="253" name="Picture 32" descr="What is Rest -A Simple Explanation for ...">
-            <a:extLst>
-              <a:ext uri="{FF2B5EF4-FFF2-40B4-BE49-F238E27FC236}">
-                <a16:creationId xmlns:a16="http://schemas.microsoft.com/office/drawing/2014/main" id="{8B907952-32FA-F16E-F675-53DA169031AD}"/>
-              </a:ext>
-            </a:extLst>
-          </p:cNvPr>
-          <p:cNvPicPr>
-            <a:picLocks noChangeAspect="1" noChangeArrowheads="1"/>
-          </p:cNvPicPr>
-          <p:nvPr/>
-        </p:nvPicPr>
-        <p:blipFill>
-          <a:blip r:embed="rId13">
-            <a:extLst>
-              <a:ext uri="{28A0092B-C50C-407E-A947-70E740481C1C}">
-                <a14:useLocalDpi xmlns:a14="http://schemas.microsoft.com/office/drawing/2010/main" val="0"/>
-              </a:ext>
-            </a:extLst>
-          </a:blip>
-          <a:srcRect/>
-          <a:stretch>
-            <a:fillRect/>
-          </a:stretch>
-        </p:blipFill>
-        <p:spPr bwMode="auto">
-          <a:xfrm>
-            <a:off x="5198204" y="985984"/>
-            <a:ext cx="829802" cy="587388"/>
-          </a:xfrm>
-          <a:prstGeom prst="rect">
-            <a:avLst/>
-          </a:prstGeom>
-          <a:noFill/>
-          <a:extLst>
-            <a:ext uri="{909E8E84-426E-40DD-AFC4-6F175D3DCCD1}">
-              <a14:hiddenFill xmlns:a14="http://schemas.microsoft.com/office/drawing/2010/main">
-                <a:solidFill>
-                  <a:srgbClr val="FFFFFF"/>
-                </a:solidFill>
-              </a14:hiddenFill>
-            </a:ext>
-          </a:extLst>
-        </p:spPr>
-      </p:pic>
-      <p:pic>
-        <p:nvPicPr>
-          <p:cNvPr id="255" name="Picture 254">
-            <a:extLst>
-              <a:ext uri="{FF2B5EF4-FFF2-40B4-BE49-F238E27FC236}">
-                <a16:creationId xmlns:a16="http://schemas.microsoft.com/office/drawing/2014/main" id="{3216D250-25E4-2B76-E568-DC9CDDEEE71C}"/>
-              </a:ext>
-            </a:extLst>
-          </p:cNvPr>
-          <p:cNvPicPr>
-            <a:picLocks noChangeAspect="1"/>
-          </p:cNvPicPr>
-          <p:nvPr/>
-        </p:nvPicPr>
-        <p:blipFill>
-          <a:blip r:embed="rId14"/>
-          <a:stretch>
-            <a:fillRect/>
-          </a:stretch>
-        </p:blipFill>
-        <p:spPr>
-          <a:xfrm>
-            <a:off x="11117156" y="159860"/>
-            <a:ext cx="1074844" cy="720566"/>
-          </a:xfrm>
-          <a:prstGeom prst="rect">
-            <a:avLst/>
-          </a:prstGeom>
-        </p:spPr>
-      </p:pic>
-      <p:pic>
-        <p:nvPicPr>
-          <p:cNvPr id="1032" name="Picture 8" descr="Google Container Registry - OpsMx">
-            <a:extLst>
-              <a:ext uri="{FF2B5EF4-FFF2-40B4-BE49-F238E27FC236}">
-                <a16:creationId xmlns:a16="http://schemas.microsoft.com/office/drawing/2014/main" id="{4EFB94E7-A311-B2CA-2419-7F1171667EC6}"/>
-              </a:ext>
-            </a:extLst>
-          </p:cNvPr>
-          <p:cNvPicPr>
-            <a:picLocks noChangeAspect="1" noChangeArrowheads="1"/>
-          </p:cNvPicPr>
-          <p:nvPr/>
-        </p:nvPicPr>
-        <p:blipFill>
-          <a:blip r:embed="rId15">
-            <a:extLst>
-              <a:ext uri="{28A0092B-C50C-407E-A947-70E740481C1C}">
-                <a14:useLocalDpi xmlns:a14="http://schemas.microsoft.com/office/drawing/2010/main" val="0"/>
-              </a:ext>
-            </a:extLst>
-          </a:blip>
-          <a:srcRect/>
-          <a:stretch>
-            <a:fillRect/>
-          </a:stretch>
-        </p:blipFill>
-        <p:spPr bwMode="auto">
-          <a:xfrm>
-            <a:off x="3173389" y="5912002"/>
-            <a:ext cx="1176370" cy="714808"/>
-          </a:xfrm>
-          <a:prstGeom prst="rect">
-            <a:avLst/>
-          </a:prstGeom>
-          <a:noFill/>
-          <a:extLst>
-            <a:ext uri="{909E8E84-426E-40DD-AFC4-6F175D3DCCD1}">
-              <a14:hiddenFill xmlns:a14="http://schemas.microsoft.com/office/drawing/2010/main">
-                <a:solidFill>
-                  <a:srgbClr val="FFFFFF"/>
-                </a:solidFill>
-              </a14:hiddenFill>
-            </a:ext>
-          </a:extLst>
-        </p:spPr>
-      </p:pic>
-      <p:pic>
-        <p:nvPicPr>
-          <p:cNvPr id="1034" name="Picture 10" descr="Google Cloud Run Jobs vs. Cloud ...">
-            <a:extLst>
-              <a:ext uri="{FF2B5EF4-FFF2-40B4-BE49-F238E27FC236}">
-                <a16:creationId xmlns:a16="http://schemas.microsoft.com/office/drawing/2014/main" id="{0DA8AE67-0386-5A5B-DA01-1DC12D202B6C}"/>
-              </a:ext>
-            </a:extLst>
-          </p:cNvPr>
-          <p:cNvPicPr>
-            <a:picLocks noChangeAspect="1" noChangeArrowheads="1"/>
-          </p:cNvPicPr>
-          <p:nvPr/>
-        </p:nvPicPr>
-        <p:blipFill>
-          <a:blip r:embed="rId16">
-            <a:extLst>
-              <a:ext uri="{28A0092B-C50C-407E-A947-70E740481C1C}">
-                <a14:useLocalDpi xmlns:a14="http://schemas.microsoft.com/office/drawing/2010/main" val="0"/>
-              </a:ext>
-            </a:extLst>
-          </a:blip>
-          <a:srcRect/>
-          <a:stretch>
-            <a:fillRect/>
-          </a:stretch>
-        </p:blipFill>
-        <p:spPr bwMode="auto">
-          <a:xfrm>
-            <a:off x="4559745" y="5962225"/>
-            <a:ext cx="1345092" cy="718551"/>
-          </a:xfrm>
-          <a:prstGeom prst="rect">
-            <a:avLst/>
-          </a:prstGeom>
-          <a:noFill/>
-          <a:extLst>
-            <a:ext uri="{909E8E84-426E-40DD-AFC4-6F175D3DCCD1}">
-              <a14:hiddenFill xmlns:a14="http://schemas.microsoft.com/office/drawing/2010/main">
-                <a:solidFill>
-                  <a:srgbClr val="FFFFFF"/>
-                </a:solidFill>
-              </a14:hiddenFill>
-            </a:ext>
-          </a:extLst>
-        </p:spPr>
-      </p:pic>
+              <a:t>POST predict</a:t>
+            </a:r>
+          </a:p>
+        </p:txBody>
+      </p:sp>
       <p:cxnSp>
         <p:nvCxnSpPr>
-          <p:cNvPr id="1024" name="Straight Arrow Connector 1023">
-            <a:extLst>
-              <a:ext uri="{FF2B5EF4-FFF2-40B4-BE49-F238E27FC236}">
-                <a16:creationId xmlns:a16="http://schemas.microsoft.com/office/drawing/2014/main" id="{83178F21-FC71-A69B-B526-B5731487E8F6}"/>
+          <p:cNvPr id="13" name="Straight Arrow Connector 12">
+            <a:extLst>
+              <a:ext uri="{FF2B5EF4-FFF2-40B4-BE49-F238E27FC236}">
+                <a16:creationId xmlns:a16="http://schemas.microsoft.com/office/drawing/2014/main" id="{6C73A14A-3AF3-B6E5-E8B8-F3DA07306129}"/>
               </a:ext>
             </a:extLst>
           </p:cNvPr>
@@ -6241,9 +6291,9 @@
           <p:nvPr/>
         </p:nvCxnSpPr>
         <p:spPr>
-          <a:xfrm flipV="1">
-            <a:off x="10693361" y="5040802"/>
-            <a:ext cx="0" cy="800190"/>
+          <a:xfrm flipH="1">
+            <a:off x="5536449" y="2103264"/>
+            <a:ext cx="1632819" cy="2064155"/>
           </a:xfrm>
           <a:prstGeom prst="straightConnector1">
             <a:avLst/>
@@ -6253,6 +6303,7 @@
               <a:srgbClr val="FF0000"/>
             </a:solidFill>
             <a:prstDash val="sysDot"/>
+            <a:headEnd type="stealth" w="lg" len="lg"/>
             <a:tailEnd type="stealth" w="lg" len="lg"/>
           </a:ln>
         </p:spPr>
@@ -6273,10 +6324,10 @@
       </p:cxnSp>
       <p:sp>
         <p:nvSpPr>
-          <p:cNvPr id="1027" name="TextBox 1026">
-            <a:extLst>
-              <a:ext uri="{FF2B5EF4-FFF2-40B4-BE49-F238E27FC236}">
-                <a16:creationId xmlns:a16="http://schemas.microsoft.com/office/drawing/2014/main" id="{B846AC75-D5CC-7458-1613-AC77B7EF97B7}"/>
+          <p:cNvPr id="17" name="TextBox 16">
+            <a:extLst>
+              <a:ext uri="{FF2B5EF4-FFF2-40B4-BE49-F238E27FC236}">
+                <a16:creationId xmlns:a16="http://schemas.microsoft.com/office/drawing/2014/main" id="{8698C9EA-DACE-A6E6-E682-4394571F5D63}"/>
               </a:ext>
             </a:extLst>
           </p:cNvPr>
@@ -6285,15 +6336,17 @@
         </p:nvSpPr>
         <p:spPr>
           <a:xfrm>
-            <a:off x="10710131" y="5194661"/>
-            <a:ext cx="1221357" cy="646331"/>
+            <a:off x="7017132" y="854069"/>
+            <a:ext cx="1565784" cy="369332"/>
           </a:xfrm>
           <a:prstGeom prst="rect">
             <a:avLst/>
           </a:prstGeom>
           <a:noFill/>
           <a:ln w="25400">
-            <a:noFill/>
+            <a:solidFill>
+              <a:schemeClr val="accent1"/>
+            </a:solidFill>
           </a:ln>
         </p:spPr>
         <p:txBody>
@@ -6305,29 +6358,31 @@
             <a:pPr algn="ctr"/>
             <a:r>
               <a:rPr lang="en-US"/>
-              <a:t>POST predict</a:t>
+              <a:t>Scheduler</a:t>
             </a:r>
           </a:p>
         </p:txBody>
       </p:sp>
       <p:cxnSp>
         <p:nvCxnSpPr>
-          <p:cNvPr id="13" name="Straight Arrow Connector 12">
-            <a:extLst>
-              <a:ext uri="{FF2B5EF4-FFF2-40B4-BE49-F238E27FC236}">
-                <a16:creationId xmlns:a16="http://schemas.microsoft.com/office/drawing/2014/main" id="{6C73A14A-3AF3-B6E5-E8B8-F3DA07306129}"/>
+          <p:cNvPr id="18" name="Straight Arrow Connector 17">
+            <a:extLst>
+              <a:ext uri="{FF2B5EF4-FFF2-40B4-BE49-F238E27FC236}">
+                <a16:creationId xmlns:a16="http://schemas.microsoft.com/office/drawing/2014/main" id="{D99D29E2-96B4-4E95-FFD6-BA420C37C43A}"/>
               </a:ext>
             </a:extLst>
           </p:cNvPr>
           <p:cNvCxnSpPr>
             <a:cxnSpLocks/>
+            <a:stCxn id="17" idx="2"/>
+            <a:endCxn id="23" idx="0"/>
           </p:cNvCxnSpPr>
           <p:nvPr/>
         </p:nvCxnSpPr>
         <p:spPr>
-          <a:xfrm flipH="1">
-            <a:off x="5536449" y="2103264"/>
-            <a:ext cx="1632819" cy="2064155"/>
+          <a:xfrm>
+            <a:off x="7800024" y="1223401"/>
+            <a:ext cx="1522" cy="510531"/>
           </a:xfrm>
           <a:prstGeom prst="straightConnector1">
             <a:avLst/>
@@ -6337,7 +6392,7 @@
               <a:srgbClr val="FF0000"/>
             </a:solidFill>
             <a:prstDash val="sysDot"/>
-            <a:headEnd type="stealth" w="lg" len="lg"/>
+            <a:headEnd type="none" w="lg" len="lg"/>
             <a:tailEnd type="stealth" w="lg" len="lg"/>
           </a:ln>
         </p:spPr>
@@ -6356,95 +6411,53 @@
           </a:fontRef>
         </p:style>
       </p:cxnSp>
-      <p:sp>
-        <p:nvSpPr>
-          <p:cNvPr id="17" name="TextBox 16">
-            <a:extLst>
-              <a:ext uri="{FF2B5EF4-FFF2-40B4-BE49-F238E27FC236}">
-                <a16:creationId xmlns:a16="http://schemas.microsoft.com/office/drawing/2014/main" id="{8698C9EA-DACE-A6E6-E682-4394571F5D63}"/>
-              </a:ext>
-            </a:extLst>
-          </p:cNvPr>
-          <p:cNvSpPr txBox="1"/>
+      <p:pic>
+        <p:nvPicPr>
+          <p:cNvPr id="21" name="Picture 4" descr="Go SVG and transparent PNG icons | TechIcons">
+            <a:extLst>
+              <a:ext uri="{FF2B5EF4-FFF2-40B4-BE49-F238E27FC236}">
+                <a16:creationId xmlns:a16="http://schemas.microsoft.com/office/drawing/2014/main" id="{E8F5AA38-9386-4A2D-17EA-188FDFB93124}"/>
+              </a:ext>
+            </a:extLst>
+          </p:cNvPr>
+          <p:cNvPicPr>
+            <a:picLocks noChangeAspect="1" noChangeArrowheads="1"/>
+          </p:cNvPicPr>
           <p:nvPr/>
-        </p:nvSpPr>
-        <p:spPr>
+        </p:nvPicPr>
+        <p:blipFill>
+          <a:blip r:embed="rId4">
+            <a:extLst>
+              <a:ext uri="{28A0092B-C50C-407E-A947-70E740481C1C}">
+                <a14:useLocalDpi xmlns:a14="http://schemas.microsoft.com/office/drawing/2010/main" val="0"/>
+              </a:ext>
+            </a:extLst>
+          </a:blip>
+          <a:srcRect/>
+          <a:stretch>
+            <a:fillRect/>
+          </a:stretch>
+        </p:blipFill>
+        <p:spPr bwMode="auto">
           <a:xfrm>
-            <a:off x="7017132" y="854069"/>
-            <a:ext cx="1565784" cy="369332"/>
+            <a:off x="8601065" y="1721776"/>
+            <a:ext cx="437348" cy="437348"/>
           </a:xfrm>
           <a:prstGeom prst="rect">
             <a:avLst/>
           </a:prstGeom>
           <a:noFill/>
-          <a:ln w="25400">
-            <a:solidFill>
-              <a:schemeClr val="accent1"/>
-            </a:solidFill>
-          </a:ln>
-        </p:spPr>
-        <p:txBody>
-          <a:bodyPr wrap="square" rtlCol="0">
-            <a:spAutoFit/>
-          </a:bodyPr>
-          <a:lstStyle/>
-          <a:p>
-            <a:pPr algn="ctr"/>
-            <a:r>
-              <a:rPr lang="en-US"/>
-              <a:t>Scheduler</a:t>
-            </a:r>
-          </a:p>
-        </p:txBody>
-      </p:sp>
-      <p:cxnSp>
-        <p:nvCxnSpPr>
-          <p:cNvPr id="18" name="Straight Arrow Connector 17">
-            <a:extLst>
-              <a:ext uri="{FF2B5EF4-FFF2-40B4-BE49-F238E27FC236}">
-                <a16:creationId xmlns:a16="http://schemas.microsoft.com/office/drawing/2014/main" id="{D99D29E2-96B4-4E95-FFD6-BA420C37C43A}"/>
-              </a:ext>
-            </a:extLst>
-          </p:cNvPr>
-          <p:cNvCxnSpPr>
-            <a:cxnSpLocks/>
-            <a:stCxn id="17" idx="2"/>
-            <a:endCxn id="23" idx="0"/>
-          </p:cNvCxnSpPr>
-          <p:nvPr/>
-        </p:nvCxnSpPr>
-        <p:spPr>
-          <a:xfrm>
-            <a:off x="7800024" y="1223401"/>
-            <a:ext cx="1522" cy="510531"/>
-          </a:xfrm>
-          <a:prstGeom prst="straightConnector1">
-            <a:avLst/>
-          </a:prstGeom>
-          <a:ln w="31750" cap="rnd" cmpd="sng">
-            <a:solidFill>
-              <a:srgbClr val="FF0000"/>
-            </a:solidFill>
-            <a:prstDash val="sysDot"/>
-            <a:headEnd type="none" w="lg" len="lg"/>
-            <a:tailEnd type="stealth" w="lg" len="lg"/>
-          </a:ln>
-        </p:spPr>
-        <p:style>
-          <a:lnRef idx="2">
-            <a:schemeClr val="accent1"/>
-          </a:lnRef>
-          <a:fillRef idx="0">
-            <a:schemeClr val="accent1"/>
-          </a:fillRef>
-          <a:effectRef idx="1">
-            <a:schemeClr val="accent1"/>
-          </a:effectRef>
-          <a:fontRef idx="minor">
-            <a:schemeClr val="tx1"/>
-          </a:fontRef>
-        </p:style>
-      </p:cxnSp>
+          <a:extLst>
+            <a:ext uri="{909E8E84-426E-40DD-AFC4-6F175D3DCCD1}">
+              <a14:hiddenFill xmlns:a14="http://schemas.microsoft.com/office/drawing/2010/main">
+                <a:solidFill>
+                  <a:srgbClr val="FFFFFF"/>
+                </a:solidFill>
+              </a14:hiddenFill>
+            </a:ext>
+          </a:extLst>
+        </p:spPr>
+      </p:pic>
     </p:spTree>
     <p:extLst>
       <p:ext uri="{BB962C8B-B14F-4D97-AF65-F5344CB8AC3E}">

</xml_diff>

<commit_message>
✅ All code, logs, and test outputs for machine learningdashboard added. ML pipeline is working robustly through Streamlit ui and ffast api.
</commit_message>
<xml_diff>
--- a/docs/pipeline_scematic.pptx
+++ b/docs/pipeline_scematic.pptx
@@ -5,11 +5,12 @@
     <p:sldMasterId id="2147483648" r:id="rId1"/>
   </p:sldMasterIdLst>
   <p:notesMasterIdLst>
-    <p:notesMasterId r:id="rId4"/>
+    <p:notesMasterId r:id="rId5"/>
   </p:notesMasterIdLst>
   <p:sldIdLst>
     <p:sldId id="256" r:id="rId2"/>
     <p:sldId id="257" r:id="rId3"/>
+    <p:sldId id="258" r:id="rId4"/>
   </p:sldIdLst>
   <p:sldSz cx="12192000" cy="6858000"/>
   <p:notesSz cx="6858000" cy="9144000"/>
@@ -119,7 +120,7 @@
 <file path=ppt/revisionInfo.xml><?xml version="1.0" encoding="utf-8"?>
 <p1510:revInfo xmlns:a="http://schemas.openxmlformats.org/drawingml/2006/main" xmlns:r="http://schemas.openxmlformats.org/officeDocument/2006/relationships" xmlns:p1510="http://schemas.microsoft.com/office/powerpoint/2015/10/main">
   <p1510:revLst>
-    <p1510:client id="{066FDBB8-ACAC-4825-842E-435133CD2304}" v="5" dt="2025-04-21T18:05:03.274"/>
+    <p1510:client id="{066FDBB8-ACAC-4825-842E-435133CD2304}" v="10" dt="2025-04-23T17:10:05.372"/>
   </p1510:revLst>
 </p1510:revInfo>
 </file>
@@ -128,13 +129,13 @@
 <pc:chgInfo xmlns:a="http://schemas.openxmlformats.org/drawingml/2006/main" xmlns:r="http://schemas.openxmlformats.org/officeDocument/2006/relationships" xmlns:ac="http://schemas.microsoft.com/office/drawing/2013/main/command" xmlns:pc="http://schemas.microsoft.com/office/powerpoint/2013/main/command">
   <pc:docChgLst>
     <pc:chgData name="Mark Lawley" userId="16677e3de322db55" providerId="LiveId" clId="{066FDBB8-ACAC-4825-842E-435133CD2304}"/>
-    <pc:docChg chg="custSel modSld">
-      <pc:chgData name="Mark Lawley" userId="16677e3de322db55" providerId="LiveId" clId="{066FDBB8-ACAC-4825-842E-435133CD2304}" dt="2025-04-21T18:05:05.776" v="70" actId="1076"/>
+    <pc:docChg chg="undo custSel addSld modSld">
+      <pc:chgData name="Mark Lawley" userId="16677e3de322db55" providerId="LiveId" clId="{066FDBB8-ACAC-4825-842E-435133CD2304}" dt="2025-04-23T17:10:55.957" v="143" actId="21"/>
       <pc:docMkLst>
         <pc:docMk/>
       </pc:docMkLst>
       <pc:sldChg chg="addSp delSp modSp mod">
-        <pc:chgData name="Mark Lawley" userId="16677e3de322db55" providerId="LiveId" clId="{066FDBB8-ACAC-4825-842E-435133CD2304}" dt="2025-04-21T18:05:05.776" v="70" actId="1076"/>
+        <pc:chgData name="Mark Lawley" userId="16677e3de322db55" providerId="LiveId" clId="{066FDBB8-ACAC-4825-842E-435133CD2304}" dt="2025-04-23T17:10:55.957" v="143" actId="21"/>
         <pc:sldMkLst>
           <pc:docMk/>
           <pc:sldMk cId="2502855908" sldId="257"/>
@@ -148,7 +149,7 @@
           </ac:spMkLst>
         </pc:spChg>
         <pc:spChg chg="mod">
-          <ac:chgData name="Mark Lawley" userId="16677e3de322db55" providerId="LiveId" clId="{066FDBB8-ACAC-4825-842E-435133CD2304}" dt="2025-04-19T06:17:37.768" v="39" actId="20577"/>
+          <ac:chgData name="Mark Lawley" userId="16677e3de322db55" providerId="LiveId" clId="{066FDBB8-ACAC-4825-842E-435133CD2304}" dt="2025-04-23T17:05:15.147" v="86" actId="20577"/>
           <ac:spMkLst>
             <pc:docMk/>
             <pc:sldMk cId="2502855908" sldId="257"/>
@@ -195,8 +196,16 @@
             <ac:picMk id="215" creationId="{7690F4DB-B38E-A7E6-AFD2-2AE5C4C95845}"/>
           </ac:picMkLst>
         </pc:picChg>
-        <pc:cxnChg chg="add mod">
-          <ac:chgData name="Mark Lawley" userId="16677e3de322db55" providerId="LiveId" clId="{066FDBB8-ACAC-4825-842E-435133CD2304}" dt="2025-04-19T06:17:23.484" v="23" actId="14100"/>
+        <pc:picChg chg="mod">
+          <ac:chgData name="Mark Lawley" userId="16677e3de322db55" providerId="LiveId" clId="{066FDBB8-ACAC-4825-842E-435133CD2304}" dt="2025-04-23T17:07:07.917" v="104" actId="1076"/>
+          <ac:picMkLst>
+            <pc:docMk/>
+            <pc:sldMk cId="2502855908" sldId="257"/>
+            <ac:picMk id="217" creationId="{0FF8DDED-E4AD-C4A2-E6E7-B91CCFC0FAB8}"/>
+          </ac:picMkLst>
+        </pc:picChg>
+        <pc:cxnChg chg="add del mod">
+          <ac:chgData name="Mark Lawley" userId="16677e3de322db55" providerId="LiveId" clId="{066FDBB8-ACAC-4825-842E-435133CD2304}" dt="2025-04-23T17:10:55.957" v="143" actId="21"/>
           <ac:cxnSpMkLst>
             <pc:docMk/>
             <pc:sldMk cId="2502855908" sldId="257"/>
@@ -204,11 +213,27 @@
           </ac:cxnSpMkLst>
         </pc:cxnChg>
         <pc:cxnChg chg="add mod">
-          <ac:chgData name="Mark Lawley" userId="16677e3de322db55" providerId="LiveId" clId="{066FDBB8-ACAC-4825-842E-435133CD2304}" dt="2025-04-19T06:18:18.123" v="66" actId="692"/>
+          <ac:chgData name="Mark Lawley" userId="16677e3de322db55" providerId="LiveId" clId="{066FDBB8-ACAC-4825-842E-435133CD2304}" dt="2025-04-23T17:05:15.147" v="86" actId="20577"/>
           <ac:cxnSpMkLst>
             <pc:docMk/>
             <pc:sldMk cId="2502855908" sldId="257"/>
             <ac:cxnSpMk id="18" creationId="{D99D29E2-96B4-4E95-FFD6-BA420C37C43A}"/>
+          </ac:cxnSpMkLst>
+        </pc:cxnChg>
+        <pc:cxnChg chg="add mod">
+          <ac:chgData name="Mark Lawley" userId="16677e3de322db55" providerId="LiveId" clId="{066FDBB8-ACAC-4825-842E-435133CD2304}" dt="2025-04-23T17:09:17.723" v="127" actId="1076"/>
+          <ac:cxnSpMkLst>
+            <pc:docMk/>
+            <pc:sldMk cId="2502855908" sldId="257"/>
+            <ac:cxnSpMk id="24" creationId="{23277FD7-711D-898D-FD2C-C6880A8B69D4}"/>
+          </ac:cxnSpMkLst>
+        </pc:cxnChg>
+        <pc:cxnChg chg="add del mod">
+          <ac:chgData name="Mark Lawley" userId="16677e3de322db55" providerId="LiveId" clId="{066FDBB8-ACAC-4825-842E-435133CD2304}" dt="2025-04-23T17:06:58.524" v="102" actId="21"/>
+          <ac:cxnSpMkLst>
+            <pc:docMk/>
+            <pc:sldMk cId="2502855908" sldId="257"/>
+            <ac:cxnSpMk id="27" creationId="{13C4F309-8DF4-FE7F-C69E-3CD4CBA5567A}"/>
           </ac:cxnSpMkLst>
         </pc:cxnChg>
         <pc:cxnChg chg="mod">
@@ -217,6 +242,30 @@
             <pc:docMk/>
             <pc:sldMk cId="2502855908" sldId="257"/>
             <ac:cxnSpMk id="44" creationId="{AE67BF63-50CD-4C0D-0250-EB05C71BA456}"/>
+          </ac:cxnSpMkLst>
+        </pc:cxnChg>
+        <pc:cxnChg chg="add del mod">
+          <ac:chgData name="Mark Lawley" userId="16677e3de322db55" providerId="LiveId" clId="{066FDBB8-ACAC-4825-842E-435133CD2304}" dt="2025-04-23T17:07:51.779" v="110" actId="21"/>
+          <ac:cxnSpMkLst>
+            <pc:docMk/>
+            <pc:sldMk cId="2502855908" sldId="257"/>
+            <ac:cxnSpMk id="53" creationId="{D7EDAEAB-F815-3609-7DF2-313F0402CD86}"/>
+          </ac:cxnSpMkLst>
+        </pc:cxnChg>
+        <pc:cxnChg chg="add del mod">
+          <ac:chgData name="Mark Lawley" userId="16677e3de322db55" providerId="LiveId" clId="{066FDBB8-ACAC-4825-842E-435133CD2304}" dt="2025-04-23T17:08:44.039" v="121" actId="21"/>
+          <ac:cxnSpMkLst>
+            <pc:docMk/>
+            <pc:sldMk cId="2502855908" sldId="257"/>
+            <ac:cxnSpMk id="54" creationId="{2C7BE029-F998-C3F9-7BBE-0F55D82AA194}"/>
+          </ac:cxnSpMkLst>
+        </pc:cxnChg>
+        <pc:cxnChg chg="add del mod">
+          <ac:chgData name="Mark Lawley" userId="16677e3de322db55" providerId="LiveId" clId="{066FDBB8-ACAC-4825-842E-435133CD2304}" dt="2025-04-23T17:09:56.549" v="134" actId="21"/>
+          <ac:cxnSpMkLst>
+            <pc:docMk/>
+            <pc:sldMk cId="2502855908" sldId="257"/>
+            <ac:cxnSpMk id="66" creationId="{2EC1EC8B-2C43-9304-03D0-F996ED878F06}"/>
           </ac:cxnSpMkLst>
         </pc:cxnChg>
         <pc:cxnChg chg="mod">
@@ -228,7 +277,7 @@
           </ac:cxnSpMkLst>
         </pc:cxnChg>
         <pc:cxnChg chg="mod">
-          <ac:chgData name="Mark Lawley" userId="16677e3de322db55" providerId="LiveId" clId="{066FDBB8-ACAC-4825-842E-435133CD2304}" dt="2025-04-19T06:17:09.461" v="19" actId="692"/>
+          <ac:chgData name="Mark Lawley" userId="16677e3de322db55" providerId="LiveId" clId="{066FDBB8-ACAC-4825-842E-435133CD2304}" dt="2025-04-23T17:10:52.415" v="142" actId="14100"/>
           <ac:cxnSpMkLst>
             <pc:docMk/>
             <pc:sldMk cId="2502855908" sldId="257"/>
@@ -244,6 +293,22 @@
           </ac:cxnSpMkLst>
         </pc:cxnChg>
         <pc:cxnChg chg="mod">
+          <ac:chgData name="Mark Lawley" userId="16677e3de322db55" providerId="LiveId" clId="{066FDBB8-ACAC-4825-842E-435133CD2304}" dt="2025-04-23T17:07:31.590" v="106" actId="14100"/>
+          <ac:cxnSpMkLst>
+            <pc:docMk/>
+            <pc:sldMk cId="2502855908" sldId="257"/>
+            <ac:cxnSpMk id="150" creationId="{4F570950-D79D-B281-A08B-0E338D1A40CD}"/>
+          </ac:cxnSpMkLst>
+        </pc:cxnChg>
+        <pc:cxnChg chg="mod">
+          <ac:chgData name="Mark Lawley" userId="16677e3de322db55" providerId="LiveId" clId="{066FDBB8-ACAC-4825-842E-435133CD2304}" dt="2025-04-23T17:07:35.528" v="107" actId="14100"/>
+          <ac:cxnSpMkLst>
+            <pc:docMk/>
+            <pc:sldMk cId="2502855908" sldId="257"/>
+            <ac:cxnSpMk id="151" creationId="{0BC3F489-D3FE-EB19-5EE6-7A3F336EF21D}"/>
+          </ac:cxnSpMkLst>
+        </pc:cxnChg>
+        <pc:cxnChg chg="mod">
           <ac:chgData name="Mark Lawley" userId="16677e3de322db55" providerId="LiveId" clId="{066FDBB8-ACAC-4825-842E-435133CD2304}" dt="2025-04-11T13:26:58.840" v="0" actId="14100"/>
           <ac:cxnSpMkLst>
             <pc:docMk/>
@@ -251,12 +316,27 @@
             <ac:cxnSpMk id="179" creationId="{B1287BB4-7CFA-4C2A-4B26-BB5D4192EF9E}"/>
           </ac:cxnSpMkLst>
         </pc:cxnChg>
-        <pc:cxnChg chg="del mod">
-          <ac:chgData name="Mark Lawley" userId="16677e3de322db55" providerId="LiveId" clId="{066FDBB8-ACAC-4825-842E-435133CD2304}" dt="2025-04-21T18:04:37.184" v="67" actId="21"/>
+      </pc:sldChg>
+      <pc:sldChg chg="addSp delSp modSp new mod">
+        <pc:chgData name="Mark Lawley" userId="16677e3de322db55" providerId="LiveId" clId="{066FDBB8-ACAC-4825-842E-435133CD2304}" dt="2025-04-23T17:10:40.112" v="140" actId="21"/>
+        <pc:sldMkLst>
+          <pc:docMk/>
+          <pc:sldMk cId="3919835353" sldId="258"/>
+        </pc:sldMkLst>
+        <pc:cxnChg chg="add del">
+          <ac:chgData name="Mark Lawley" userId="16677e3de322db55" providerId="LiveId" clId="{066FDBB8-ACAC-4825-842E-435133CD2304}" dt="2025-04-23T17:10:38.639" v="139" actId="21"/>
           <ac:cxnSpMkLst>
             <pc:docMk/>
-            <pc:sldMk cId="2502855908" sldId="257"/>
-            <ac:cxnSpMk id="201" creationId="{00D48105-6C12-77D3-CAC8-B7B75635DEB1}"/>
+            <pc:sldMk cId="3919835353" sldId="258"/>
+            <ac:cxnSpMk id="4" creationId="{8840F665-BCEB-6BE0-2D2F-F9439763602C}"/>
+          </ac:cxnSpMkLst>
+        </pc:cxnChg>
+        <pc:cxnChg chg="add del mod">
+          <ac:chgData name="Mark Lawley" userId="16677e3de322db55" providerId="LiveId" clId="{066FDBB8-ACAC-4825-842E-435133CD2304}" dt="2025-04-23T17:10:40.112" v="140" actId="21"/>
+          <ac:cxnSpMkLst>
+            <pc:docMk/>
+            <pc:sldMk cId="3919835353" sldId="258"/>
+            <ac:cxnSpMk id="66" creationId="{2EC1EC8B-2C43-9304-03D0-F996ED878F06}"/>
           </ac:cxnSpMkLst>
         </pc:cxnChg>
       </pc:sldChg>
@@ -4422,7 +4502,7 @@
         <p:spPr>
           <a:xfrm>
             <a:off x="7018654" y="1733932"/>
-            <a:ext cx="1565784" cy="369332"/>
+            <a:ext cx="1565784" cy="646331"/>
           </a:xfrm>
           <a:prstGeom prst="rect">
             <a:avLst/>
@@ -4445,6 +4525,10 @@
               <a:rPr lang="en-US"/>
               <a:t>Trigger</a:t>
             </a:r>
+          </a:p>
+          <a:p>
+            <a:pPr algn="ctr"/>
+            <a:endParaRPr lang="en-US"/>
           </a:p>
         </p:txBody>
       </p:sp>
@@ -5073,8 +5157,8 @@
         </p:nvCxnSpPr>
         <p:spPr>
           <a:xfrm flipH="1">
-            <a:off x="5936372" y="2005529"/>
-            <a:ext cx="1031096" cy="864558"/>
+            <a:off x="5886512" y="2317631"/>
+            <a:ext cx="1154820" cy="1849788"/>
           </a:xfrm>
           <a:prstGeom prst="straightConnector1">
             <a:avLst/>
@@ -5291,12 +5375,12 @@
         </p:nvCxnSpPr>
         <p:spPr>
           <a:xfrm flipV="1">
-            <a:off x="5911706" y="3324586"/>
-            <a:ext cx="1106950" cy="884773"/>
+            <a:off x="5904730" y="3324586"/>
+            <a:ext cx="1113926" cy="989615"/>
           </a:xfrm>
           <a:prstGeom prst="bentConnector3">
             <a:avLst>
-              <a:gd name="adj1" fmla="val 50000"/>
+              <a:gd name="adj1" fmla="val 65005"/>
             </a:avLst>
           </a:prstGeom>
           <a:ln>
@@ -5342,7 +5426,7 @@
           </a:xfrm>
           <a:prstGeom prst="bentConnector3">
             <a:avLst>
-              <a:gd name="adj1" fmla="val 50000"/>
+              <a:gd name="adj1" fmla="val 63391"/>
             </a:avLst>
           </a:prstGeom>
           <a:ln>
@@ -5799,7 +5883,7 @@
         </p:blipFill>
         <p:spPr>
           <a:xfrm>
-            <a:off x="8382638" y="2359316"/>
+            <a:off x="8692973" y="2388145"/>
             <a:ext cx="470667" cy="404189"/>
           </a:xfrm>
           <a:prstGeom prst="rect">
@@ -6276,52 +6360,6 @@
           </a:p>
         </p:txBody>
       </p:sp>
-      <p:cxnSp>
-        <p:nvCxnSpPr>
-          <p:cNvPr id="13" name="Straight Arrow Connector 12">
-            <a:extLst>
-              <a:ext uri="{FF2B5EF4-FFF2-40B4-BE49-F238E27FC236}">
-                <a16:creationId xmlns:a16="http://schemas.microsoft.com/office/drawing/2014/main" id="{6C73A14A-3AF3-B6E5-E8B8-F3DA07306129}"/>
-              </a:ext>
-            </a:extLst>
-          </p:cNvPr>
-          <p:cNvCxnSpPr>
-            <a:cxnSpLocks/>
-          </p:cNvCxnSpPr>
-          <p:nvPr/>
-        </p:nvCxnSpPr>
-        <p:spPr>
-          <a:xfrm flipH="1">
-            <a:off x="5536449" y="2103264"/>
-            <a:ext cx="1632819" cy="2064155"/>
-          </a:xfrm>
-          <a:prstGeom prst="straightConnector1">
-            <a:avLst/>
-          </a:prstGeom>
-          <a:ln w="31750" cap="rnd" cmpd="sng">
-            <a:solidFill>
-              <a:srgbClr val="FF0000"/>
-            </a:solidFill>
-            <a:prstDash val="sysDot"/>
-            <a:headEnd type="stealth" w="lg" len="lg"/>
-            <a:tailEnd type="stealth" w="lg" len="lg"/>
-          </a:ln>
-        </p:spPr>
-        <p:style>
-          <a:lnRef idx="2">
-            <a:schemeClr val="accent1"/>
-          </a:lnRef>
-          <a:fillRef idx="0">
-            <a:schemeClr val="accent1"/>
-          </a:fillRef>
-          <a:effectRef idx="1">
-            <a:schemeClr val="accent1"/>
-          </a:effectRef>
-          <a:fontRef idx="minor">
-            <a:schemeClr val="tx1"/>
-          </a:fontRef>
-        </p:style>
-      </p:cxnSp>
       <p:sp>
         <p:nvSpPr>
           <p:cNvPr id="17" name="TextBox 16">
@@ -6458,10 +6496,88 @@
           </a:extLst>
         </p:spPr>
       </p:pic>
+      <p:cxnSp>
+        <p:nvCxnSpPr>
+          <p:cNvPr id="24" name="Connector: Elbow 23">
+            <a:extLst>
+              <a:ext uri="{FF2B5EF4-FFF2-40B4-BE49-F238E27FC236}">
+                <a16:creationId xmlns:a16="http://schemas.microsoft.com/office/drawing/2014/main" id="{23277FD7-711D-898D-FD2C-C6880A8B69D4}"/>
+              </a:ext>
+            </a:extLst>
+          </p:cNvPr>
+          <p:cNvCxnSpPr>
+            <a:cxnSpLocks/>
+          </p:cNvCxnSpPr>
+          <p:nvPr/>
+        </p:nvCxnSpPr>
+        <p:spPr>
+          <a:xfrm rot="10800000" flipV="1">
+            <a:off x="5881061" y="2014572"/>
+            <a:ext cx="1106948" cy="1006245"/>
+          </a:xfrm>
+          <a:prstGeom prst="bentConnector3">
+            <a:avLst>
+              <a:gd name="adj1" fmla="val 71318"/>
+            </a:avLst>
+          </a:prstGeom>
+          <a:ln w="25400">
+            <a:solidFill>
+              <a:srgbClr val="FF0000"/>
+            </a:solidFill>
+            <a:prstDash val="sysDot"/>
+            <a:headEnd type="stealth" w="lg" len="lg"/>
+            <a:tailEnd type="stealth" w="lg" len="lg"/>
+          </a:ln>
+        </p:spPr>
+        <p:style>
+          <a:lnRef idx="2">
+            <a:schemeClr val="accent1"/>
+          </a:lnRef>
+          <a:fillRef idx="0">
+            <a:schemeClr val="accent1"/>
+          </a:fillRef>
+          <a:effectRef idx="1">
+            <a:schemeClr val="accent1"/>
+          </a:effectRef>
+          <a:fontRef idx="minor">
+            <a:schemeClr val="tx1"/>
+          </a:fontRef>
+        </p:style>
+      </p:cxnSp>
     </p:spTree>
     <p:extLst>
       <p:ext uri="{BB962C8B-B14F-4D97-AF65-F5344CB8AC3E}">
         <p14:creationId xmlns:p14="http://schemas.microsoft.com/office/powerpoint/2010/main" val="2502855908"/>
+      </p:ext>
+    </p:extLst>
+  </p:cSld>
+  <p:clrMapOvr>
+    <a:masterClrMapping/>
+  </p:clrMapOvr>
+</p:sld>
+</file>
+
+<file path=ppt/slides/slide3.xml><?xml version="1.0" encoding="utf-8"?>
+<p:sld xmlns:a="http://schemas.openxmlformats.org/drawingml/2006/main" xmlns:r="http://schemas.openxmlformats.org/officeDocument/2006/relationships" xmlns:p="http://schemas.openxmlformats.org/presentationml/2006/main">
+  <p:cSld>
+    <p:spTree>
+      <p:nvGrpSpPr>
+        <p:cNvPr id="1" name=""/>
+        <p:cNvGrpSpPr/>
+        <p:nvPr/>
+      </p:nvGrpSpPr>
+      <p:grpSpPr>
+        <a:xfrm>
+          <a:off x="0" y="0"/>
+          <a:ext cx="0" cy="0"/>
+          <a:chOff x="0" y="0"/>
+          <a:chExt cx="0" cy="0"/>
+        </a:xfrm>
+      </p:grpSpPr>
+    </p:spTree>
+    <p:extLst>
+      <p:ext uri="{BB962C8B-B14F-4D97-AF65-F5344CB8AC3E}">
+        <p14:creationId xmlns:p14="http://schemas.microsoft.com/office/powerpoint/2010/main" val="3919835353"/>
       </p:ext>
     </p:extLst>
   </p:cSld>

</xml_diff>